<commit_message>
back to the readme..
</commit_message>
<xml_diff>
--- a/Airbnb Presentation.pptx
+++ b/Airbnb Presentation.pptx
@@ -10,8 +10,9 @@
     <p:sldId id="258" r:id="rId4"/>
     <p:sldId id="259" r:id="rId5"/>
     <p:sldId id="260" r:id="rId6"/>
-    <p:sldId id="262" r:id="rId7"/>
-    <p:sldId id="261" r:id="rId8"/>
+    <p:sldId id="261" r:id="rId7"/>
+    <p:sldId id="262" r:id="rId8"/>
+    <p:sldId id="263" r:id="rId9"/>
   </p:sldIdLst>
   <p:sldSz cx="12192000" cy="6858000"/>
   <p:notesSz cx="6858000" cy="9144000"/>
@@ -113,7 +114,7 @@
   <p:extLst>
     <p:ext uri="{EFAFB233-063F-42B5-8137-9DF3F51BA10A}">
       <p15:sldGuideLst xmlns:p15="http://schemas.microsoft.com/office/powerpoint/2012/main">
-        <p15:guide id="1" orient="horz" pos="2160" userDrawn="1">
+        <p15:guide id="1" orient="horz" pos="2928" userDrawn="1">
           <p15:clr>
             <a:srgbClr val="A4A3A4"/>
           </p15:clr>
@@ -1003,7 +1004,7 @@
         <a:p>
           <a:r>
             <a:rPr lang="en-US" dirty="0"/>
-            <a:t>Selecting Features</a:t>
+            <a:t>EDA</a:t>
           </a:r>
         </a:p>
       </dgm:t>
@@ -1072,13 +1073,7 @@
         <a:p>
           <a:r>
             <a:rPr lang="en-US" dirty="0"/>
-            <a:t>Input </a:t>
-          </a:r>
-        </a:p>
-        <a:p>
-          <a:r>
-            <a:rPr lang="en-US" dirty="0"/>
-            <a:t>Strategies</a:t>
+            <a:t>Model</a:t>
           </a:r>
         </a:p>
       </dgm:t>
@@ -1274,7 +1269,7 @@
       </dsp:nvSpPr>
       <dsp:spPr>
         <a:xfrm>
-          <a:off x="6129" y="1003514"/>
+          <a:off x="6129" y="967514"/>
           <a:ext cx="3005351" cy="1202140"/>
         </a:xfrm>
         <a:prstGeom prst="chevron">
@@ -1316,12 +1311,12 @@
         </a:fontRef>
       </dsp:style>
       <dsp:txBody>
-        <a:bodyPr spcFirstLastPara="0" vert="horz" wrap="square" lIns="116015" tIns="38672" rIns="38672" bIns="38672" numCol="1" spcCol="1270" anchor="ctr" anchorCtr="0">
+        <a:bodyPr spcFirstLastPara="0" vert="horz" wrap="square" lIns="132017" tIns="44006" rIns="44006" bIns="44006" numCol="1" spcCol="1270" anchor="ctr" anchorCtr="0">
           <a:noAutofit/>
         </a:bodyPr>
         <a:lstStyle/>
         <a:p>
-          <a:pPr marL="0" lvl="0" indent="0" algn="ctr" defTabSz="1289050">
+          <a:pPr marL="0" lvl="0" indent="0" algn="ctr" defTabSz="1466850">
             <a:lnSpc>
               <a:spcPct val="90000"/>
             </a:lnSpc>
@@ -1334,13 +1329,13 @@
             <a:buNone/>
           </a:pPr>
           <a:r>
-            <a:rPr lang="en-US" sz="2900" kern="1200" dirty="0"/>
+            <a:rPr lang="en-US" sz="3300" kern="1200" dirty="0"/>
             <a:t>Cleaning Data</a:t>
           </a:r>
         </a:p>
       </dsp:txBody>
       <dsp:txXfrm>
-        <a:off x="607199" y="1003514"/>
+        <a:off x="607199" y="967514"/>
         <a:ext cx="1803211" cy="1202140"/>
       </dsp:txXfrm>
     </dsp:sp>
@@ -1351,8 +1346,8 @@
       </dsp:nvSpPr>
       <dsp:spPr>
         <a:xfrm>
-          <a:off x="6129" y="2355922"/>
-          <a:ext cx="2404281" cy="522000"/>
+          <a:off x="6129" y="2319922"/>
+          <a:ext cx="2404281" cy="594000"/>
         </a:xfrm>
         <a:prstGeom prst="rect">
           <a:avLst/>
@@ -1381,7 +1376,7 @@
         </a:bodyPr>
         <a:lstStyle/>
         <a:p>
-          <a:pPr marL="285750" lvl="1" indent="-285750" algn="l" defTabSz="1289050">
+          <a:pPr marL="285750" lvl="1" indent="-285750" algn="l" defTabSz="1466850">
             <a:lnSpc>
               <a:spcPct val="90000"/>
             </a:lnSpc>
@@ -1393,12 +1388,12 @@
             </a:spcAft>
             <a:buChar char="•"/>
           </a:pPr>
-          <a:endParaRPr lang="en-US" sz="2900" kern="1200" dirty="0"/>
+          <a:endParaRPr lang="en-US" sz="3300" kern="1200" dirty="0"/>
         </a:p>
       </dsp:txBody>
       <dsp:txXfrm>
-        <a:off x="6129" y="2355922"/>
-        <a:ext cx="2404281" cy="522000"/>
+        <a:off x="6129" y="2319922"/>
+        <a:ext cx="2404281" cy="594000"/>
       </dsp:txXfrm>
     </dsp:sp>
     <dsp:sp modelId="{5531014E-3B4B-974D-83FE-5F0ECF3AD72A}">
@@ -1408,7 +1403,7 @@
       </dsp:nvSpPr>
       <dsp:spPr>
         <a:xfrm>
-          <a:off x="2795480" y="1003514"/>
+          <a:off x="2795480" y="967514"/>
           <a:ext cx="3005351" cy="1202140"/>
         </a:xfrm>
         <a:prstGeom prst="chevron">
@@ -1450,12 +1445,12 @@
         </a:fontRef>
       </dsp:style>
       <dsp:txBody>
-        <a:bodyPr spcFirstLastPara="0" vert="horz" wrap="square" lIns="116015" tIns="38672" rIns="38672" bIns="38672" numCol="1" spcCol="1270" anchor="ctr" anchorCtr="0">
+        <a:bodyPr spcFirstLastPara="0" vert="horz" wrap="square" lIns="132017" tIns="44006" rIns="44006" bIns="44006" numCol="1" spcCol="1270" anchor="ctr" anchorCtr="0">
           <a:noAutofit/>
         </a:bodyPr>
         <a:lstStyle/>
         <a:p>
-          <a:pPr marL="0" lvl="0" indent="0" algn="ctr" defTabSz="1289050">
+          <a:pPr marL="0" lvl="0" indent="0" algn="ctr" defTabSz="1466850">
             <a:lnSpc>
               <a:spcPct val="90000"/>
             </a:lnSpc>
@@ -1468,13 +1463,13 @@
             <a:buNone/>
           </a:pPr>
           <a:r>
-            <a:rPr lang="en-US" sz="2900" kern="1200" dirty="0"/>
-            <a:t>Selecting Features</a:t>
+            <a:rPr lang="en-US" sz="3300" kern="1200" dirty="0"/>
+            <a:t>EDA</a:t>
           </a:r>
         </a:p>
       </dsp:txBody>
       <dsp:txXfrm>
-        <a:off x="3396550" y="1003514"/>
+        <a:off x="3396550" y="967514"/>
         <a:ext cx="1803211" cy="1202140"/>
       </dsp:txXfrm>
     </dsp:sp>
@@ -1485,8 +1480,8 @@
       </dsp:nvSpPr>
       <dsp:spPr>
         <a:xfrm>
-          <a:off x="2795480" y="2355922"/>
-          <a:ext cx="2404281" cy="522000"/>
+          <a:off x="2795480" y="2319922"/>
+          <a:ext cx="2404281" cy="594000"/>
         </a:xfrm>
         <a:prstGeom prst="rect">
           <a:avLst/>
@@ -1515,7 +1510,7 @@
         </a:bodyPr>
         <a:lstStyle/>
         <a:p>
-          <a:pPr marL="285750" lvl="1" indent="-285750" algn="l" defTabSz="1289050">
+          <a:pPr marL="285750" lvl="1" indent="-285750" algn="l" defTabSz="1466850">
             <a:lnSpc>
               <a:spcPct val="90000"/>
             </a:lnSpc>
@@ -1527,12 +1522,12 @@
             </a:spcAft>
             <a:buChar char="•"/>
           </a:pPr>
-          <a:endParaRPr lang="en-US" sz="2900" kern="1200" dirty="0"/>
+          <a:endParaRPr lang="en-US" sz="3300" kern="1200" dirty="0"/>
         </a:p>
       </dsp:txBody>
       <dsp:txXfrm>
-        <a:off x="2795480" y="2355922"/>
-        <a:ext cx="2404281" cy="522000"/>
+        <a:off x="2795480" y="2319922"/>
+        <a:ext cx="2404281" cy="594000"/>
       </dsp:txXfrm>
     </dsp:sp>
     <dsp:sp modelId="{AB3CFC13-4779-2A4B-BDCE-5ABFC23D20C3}">
@@ -1542,7 +1537,7 @@
       </dsp:nvSpPr>
       <dsp:spPr>
         <a:xfrm>
-          <a:off x="5584831" y="1003514"/>
+          <a:off x="5584831" y="967514"/>
           <a:ext cx="3005351" cy="1202140"/>
         </a:xfrm>
         <a:prstGeom prst="chevron">
@@ -1584,12 +1579,12 @@
         </a:fontRef>
       </dsp:style>
       <dsp:txBody>
-        <a:bodyPr spcFirstLastPara="0" vert="horz" wrap="square" lIns="116015" tIns="38672" rIns="38672" bIns="38672" numCol="1" spcCol="1270" anchor="ctr" anchorCtr="0">
+        <a:bodyPr spcFirstLastPara="0" vert="horz" wrap="square" lIns="132017" tIns="44006" rIns="44006" bIns="44006" numCol="1" spcCol="1270" anchor="ctr" anchorCtr="0">
           <a:noAutofit/>
         </a:bodyPr>
         <a:lstStyle/>
         <a:p>
-          <a:pPr marL="0" lvl="0" indent="0" algn="ctr" defTabSz="1289050">
+          <a:pPr marL="0" lvl="0" indent="0" algn="ctr" defTabSz="1466850">
             <a:lnSpc>
               <a:spcPct val="90000"/>
             </a:lnSpc>
@@ -1602,31 +1597,13 @@
             <a:buNone/>
           </a:pPr>
           <a:r>
-            <a:rPr lang="en-US" sz="2900" kern="1200" dirty="0"/>
-            <a:t>Input </a:t>
-          </a:r>
-        </a:p>
-        <a:p>
-          <a:pPr marL="0" lvl="0" indent="0" algn="ctr" defTabSz="1289050">
-            <a:lnSpc>
-              <a:spcPct val="90000"/>
-            </a:lnSpc>
-            <a:spcBef>
-              <a:spcPct val="0"/>
-            </a:spcBef>
-            <a:spcAft>
-              <a:spcPct val="35000"/>
-            </a:spcAft>
-            <a:buNone/>
-          </a:pPr>
-          <a:r>
-            <a:rPr lang="en-US" sz="2900" kern="1200" dirty="0"/>
-            <a:t>Strategies</a:t>
+            <a:rPr lang="en-US" sz="3300" kern="1200" dirty="0"/>
+            <a:t>Model</a:t>
           </a:r>
         </a:p>
       </dsp:txBody>
       <dsp:txXfrm>
-        <a:off x="6185901" y="1003514"/>
+        <a:off x="6185901" y="967514"/>
         <a:ext cx="1803211" cy="1202140"/>
       </dsp:txXfrm>
     </dsp:sp>
@@ -1637,8 +1614,8 @@
       </dsp:nvSpPr>
       <dsp:spPr>
         <a:xfrm>
-          <a:off x="5584831" y="2355922"/>
-          <a:ext cx="2404281" cy="522000"/>
+          <a:off x="5584831" y="2319922"/>
+          <a:ext cx="2404281" cy="594000"/>
         </a:xfrm>
         <a:prstGeom prst="rect">
           <a:avLst/>
@@ -1667,7 +1644,7 @@
         </a:bodyPr>
         <a:lstStyle/>
         <a:p>
-          <a:pPr marL="285750" lvl="1" indent="-285750" algn="l" defTabSz="1289050">
+          <a:pPr marL="285750" lvl="1" indent="-285750" algn="l" defTabSz="1466850">
             <a:lnSpc>
               <a:spcPct val="90000"/>
             </a:lnSpc>
@@ -1679,12 +1656,12 @@
             </a:spcAft>
             <a:buChar char="•"/>
           </a:pPr>
-          <a:endParaRPr lang="en-US" sz="2900" kern="1200" dirty="0"/>
+          <a:endParaRPr lang="en-US" sz="3300" kern="1200" dirty="0"/>
         </a:p>
       </dsp:txBody>
       <dsp:txXfrm>
-        <a:off x="5584831" y="2355922"/>
-        <a:ext cx="2404281" cy="522000"/>
+        <a:off x="5584831" y="2319922"/>
+        <a:ext cx="2404281" cy="594000"/>
       </dsp:txXfrm>
     </dsp:sp>
   </dsp:spTree>
@@ -8881,6 +8858,138 @@
       </p:grpSpPr>
       <p:sp>
         <p:nvSpPr>
+          <p:cNvPr id="24" name="Oval 23">
+            <a:extLst>
+              <a:ext uri="{FF2B5EF4-FFF2-40B4-BE49-F238E27FC236}">
+                <a16:creationId xmlns:a16="http://schemas.microsoft.com/office/drawing/2014/main" id="{D7E52149-85C6-3685-6C3F-A692931E9B97}"/>
+              </a:ext>
+            </a:extLst>
+          </p:cNvPr>
+          <p:cNvSpPr/>
+          <p:nvPr/>
+        </p:nvSpPr>
+        <p:spPr>
+          <a:xfrm>
+            <a:off x="4371972" y="2882900"/>
+            <a:ext cx="1741714" cy="1765300"/>
+          </a:xfrm>
+          <a:prstGeom prst="ellipse">
+            <a:avLst/>
+          </a:prstGeom>
+        </p:spPr>
+        <p:style>
+          <a:lnRef idx="1">
+            <a:schemeClr val="accent3"/>
+          </a:lnRef>
+          <a:fillRef idx="2">
+            <a:schemeClr val="accent3"/>
+          </a:fillRef>
+          <a:effectRef idx="1">
+            <a:schemeClr val="accent3"/>
+          </a:effectRef>
+          <a:fontRef idx="minor">
+            <a:schemeClr val="dk1"/>
+          </a:fontRef>
+        </p:style>
+        <p:txBody>
+          <a:bodyPr rtlCol="0" anchor="ctr"/>
+          <a:lstStyle/>
+          <a:p>
+            <a:pPr algn="ctr"/>
+            <a:endParaRPr lang="en-US"/>
+          </a:p>
+        </p:txBody>
+      </p:sp>
+      <p:sp>
+        <p:nvSpPr>
+          <p:cNvPr id="25" name="Oval 24">
+            <a:extLst>
+              <a:ext uri="{FF2B5EF4-FFF2-40B4-BE49-F238E27FC236}">
+                <a16:creationId xmlns:a16="http://schemas.microsoft.com/office/drawing/2014/main" id="{F118416D-DDBA-948A-1F8B-43DC0543714A}"/>
+              </a:ext>
+            </a:extLst>
+          </p:cNvPr>
+          <p:cNvSpPr/>
+          <p:nvPr/>
+        </p:nvSpPr>
+        <p:spPr>
+          <a:xfrm>
+            <a:off x="7193248" y="2907393"/>
+            <a:ext cx="1741714" cy="1765300"/>
+          </a:xfrm>
+          <a:prstGeom prst="ellipse">
+            <a:avLst/>
+          </a:prstGeom>
+        </p:spPr>
+        <p:style>
+          <a:lnRef idx="1">
+            <a:schemeClr val="accent3"/>
+          </a:lnRef>
+          <a:fillRef idx="2">
+            <a:schemeClr val="accent3"/>
+          </a:fillRef>
+          <a:effectRef idx="1">
+            <a:schemeClr val="accent3"/>
+          </a:effectRef>
+          <a:fontRef idx="minor">
+            <a:schemeClr val="dk1"/>
+          </a:fontRef>
+        </p:style>
+        <p:txBody>
+          <a:bodyPr rtlCol="0" anchor="ctr"/>
+          <a:lstStyle/>
+          <a:p>
+            <a:pPr algn="ctr"/>
+            <a:endParaRPr lang="en-US"/>
+          </a:p>
+        </p:txBody>
+      </p:sp>
+      <p:sp>
+        <p:nvSpPr>
+          <p:cNvPr id="23" name="Oval 22">
+            <a:extLst>
+              <a:ext uri="{FF2B5EF4-FFF2-40B4-BE49-F238E27FC236}">
+                <a16:creationId xmlns:a16="http://schemas.microsoft.com/office/drawing/2014/main" id="{BFB9F1D3-F772-239E-BD90-C7DD67B30E7E}"/>
+              </a:ext>
+            </a:extLst>
+          </p:cNvPr>
+          <p:cNvSpPr/>
+          <p:nvPr/>
+        </p:nvSpPr>
+        <p:spPr>
+          <a:xfrm>
+            <a:off x="1551947" y="2881993"/>
+            <a:ext cx="1741714" cy="1765300"/>
+          </a:xfrm>
+          <a:prstGeom prst="ellipse">
+            <a:avLst/>
+          </a:prstGeom>
+        </p:spPr>
+        <p:style>
+          <a:lnRef idx="1">
+            <a:schemeClr val="accent3"/>
+          </a:lnRef>
+          <a:fillRef idx="2">
+            <a:schemeClr val="accent3"/>
+          </a:fillRef>
+          <a:effectRef idx="1">
+            <a:schemeClr val="accent3"/>
+          </a:effectRef>
+          <a:fontRef idx="minor">
+            <a:schemeClr val="dk1"/>
+          </a:fontRef>
+        </p:style>
+        <p:txBody>
+          <a:bodyPr rtlCol="0" anchor="ctr"/>
+          <a:lstStyle/>
+          <a:p>
+            <a:pPr algn="ctr"/>
+            <a:endParaRPr lang="en-US"/>
+          </a:p>
+        </p:txBody>
+      </p:sp>
+      <p:sp>
+        <p:nvSpPr>
           <p:cNvPr id="2" name="Title 1">
             <a:extLst>
               <a:ext uri="{FF2B5EF4-FFF2-40B4-BE49-F238E27FC236}">
@@ -8937,7 +9046,7 @@
         </p:blipFill>
         <p:spPr>
           <a:xfrm>
-            <a:off x="5355772" y="5598886"/>
+            <a:off x="10228356" y="2393043"/>
             <a:ext cx="914400" cy="914400"/>
           </a:xfrm>
         </p:spPr>
@@ -8964,8 +9073,8 @@
         </p:blipFill>
         <p:spPr>
           <a:xfrm>
-            <a:off x="8475134" y="534458"/>
-            <a:ext cx="2353732" cy="735542"/>
+            <a:off x="4479981" y="3494503"/>
+            <a:ext cx="1525695" cy="476780"/>
           </a:xfrm>
           <a:prstGeom prst="rect">
             <a:avLst/>
@@ -9000,8 +9109,8 @@
         </p:blipFill>
         <p:spPr>
           <a:xfrm>
-            <a:off x="6004389" y="4853971"/>
-            <a:ext cx="914400" cy="914400"/>
+            <a:off x="7575353" y="3399669"/>
+            <a:ext cx="977504" cy="839107"/>
           </a:xfrm>
           <a:prstGeom prst="rect">
             <a:avLst/>
@@ -9036,7 +9145,7 @@
         </p:blipFill>
         <p:spPr>
           <a:xfrm>
-            <a:off x="6653006" y="5598886"/>
+            <a:off x="8135862" y="304800"/>
             <a:ext cx="914400" cy="914400"/>
           </a:xfrm>
           <a:prstGeom prst="rect">
@@ -9072,7 +9181,7 @@
         </p:blipFill>
         <p:spPr>
           <a:xfrm>
-            <a:off x="6147405" y="2576286"/>
+            <a:off x="9050262" y="609600"/>
             <a:ext cx="914400" cy="914400"/>
           </a:xfrm>
           <a:prstGeom prst="rect">
@@ -9108,7 +9217,7 @@
         </p:blipFill>
         <p:spPr>
           <a:xfrm>
-            <a:off x="6924837" y="1820485"/>
+            <a:off x="9293979" y="1548342"/>
             <a:ext cx="914400" cy="914400"/>
           </a:xfrm>
           <a:prstGeom prst="rect">
@@ -9144,7 +9253,7 @@
         </p:blipFill>
         <p:spPr>
           <a:xfrm>
-            <a:off x="5355772" y="2005542"/>
+            <a:off x="8247732" y="1219200"/>
             <a:ext cx="914400" cy="914400"/>
           </a:xfrm>
           <a:prstGeom prst="rect">
@@ -9152,6 +9261,130 @@
           </a:prstGeom>
         </p:spPr>
       </p:pic>
+      <p:pic>
+        <p:nvPicPr>
+          <p:cNvPr id="22" name="Graphic 21" descr="Home">
+            <a:extLst>
+              <a:ext uri="{FF2B5EF4-FFF2-40B4-BE49-F238E27FC236}">
+                <a16:creationId xmlns:a16="http://schemas.microsoft.com/office/drawing/2014/main" id="{760FD14C-4BE0-A00B-A099-23ACA47B8553}"/>
+              </a:ext>
+            </a:extLst>
+          </p:cNvPr>
+          <p:cNvPicPr>
+            <a:picLocks noChangeAspect="1"/>
+          </p:cNvPicPr>
+          <p:nvPr/>
+        </p:nvPicPr>
+        <p:blipFill>
+          <a:blip r:embed="rId15">
+            <a:extLst>
+              <a:ext uri="{96DAC541-7B7A-43D3-8B79-37D633B846F1}">
+                <asvg:svgBlip xmlns:asvg="http://schemas.microsoft.com/office/drawing/2016/SVG/main" r:embed="rId16"/>
+              </a:ext>
+            </a:extLst>
+          </a:blip>
+          <a:stretch>
+            <a:fillRect/>
+          </a:stretch>
+        </p:blipFill>
+        <p:spPr>
+          <a:xfrm>
+            <a:off x="2029103" y="3307443"/>
+            <a:ext cx="807357" cy="807357"/>
+          </a:xfrm>
+          <a:prstGeom prst="rect">
+            <a:avLst/>
+          </a:prstGeom>
+        </p:spPr>
+      </p:pic>
+      <p:sp>
+        <p:nvSpPr>
+          <p:cNvPr id="26" name="Right Arrow 25">
+            <a:extLst>
+              <a:ext uri="{FF2B5EF4-FFF2-40B4-BE49-F238E27FC236}">
+                <a16:creationId xmlns:a16="http://schemas.microsoft.com/office/drawing/2014/main" id="{62D67AA8-5ED0-EBCF-C354-7FFC802D6B6A}"/>
+              </a:ext>
+            </a:extLst>
+          </p:cNvPr>
+          <p:cNvSpPr/>
+          <p:nvPr/>
+        </p:nvSpPr>
+        <p:spPr>
+          <a:xfrm>
+            <a:off x="3581400" y="3657600"/>
+            <a:ext cx="408467" cy="581176"/>
+          </a:xfrm>
+          <a:prstGeom prst="rightArrow">
+            <a:avLst/>
+          </a:prstGeom>
+        </p:spPr>
+        <p:style>
+          <a:lnRef idx="1">
+            <a:schemeClr val="dk1"/>
+          </a:lnRef>
+          <a:fillRef idx="2">
+            <a:schemeClr val="dk1"/>
+          </a:fillRef>
+          <a:effectRef idx="1">
+            <a:schemeClr val="dk1"/>
+          </a:effectRef>
+          <a:fontRef idx="minor">
+            <a:schemeClr val="dk1"/>
+          </a:fontRef>
+        </p:style>
+        <p:txBody>
+          <a:bodyPr rtlCol="0" anchor="ctr"/>
+          <a:lstStyle/>
+          <a:p>
+            <a:pPr algn="ctr"/>
+            <a:endParaRPr lang="en-US"/>
+          </a:p>
+        </p:txBody>
+      </p:sp>
+      <p:sp>
+        <p:nvSpPr>
+          <p:cNvPr id="27" name="Right Arrow 26">
+            <a:extLst>
+              <a:ext uri="{FF2B5EF4-FFF2-40B4-BE49-F238E27FC236}">
+                <a16:creationId xmlns:a16="http://schemas.microsoft.com/office/drawing/2014/main" id="{8FFCC95D-4A27-1D1A-4C43-1F8CFA62C353}"/>
+              </a:ext>
+            </a:extLst>
+          </p:cNvPr>
+          <p:cNvSpPr/>
+          <p:nvPr/>
+        </p:nvSpPr>
+        <p:spPr>
+          <a:xfrm>
+            <a:off x="6495791" y="3643905"/>
+            <a:ext cx="408467" cy="581176"/>
+          </a:xfrm>
+          <a:prstGeom prst="rightArrow">
+            <a:avLst/>
+          </a:prstGeom>
+        </p:spPr>
+        <p:style>
+          <a:lnRef idx="1">
+            <a:schemeClr val="dk1"/>
+          </a:lnRef>
+          <a:fillRef idx="2">
+            <a:schemeClr val="dk1"/>
+          </a:fillRef>
+          <a:effectRef idx="1">
+            <a:schemeClr val="dk1"/>
+          </a:effectRef>
+          <a:fontRef idx="minor">
+            <a:schemeClr val="dk1"/>
+          </a:fontRef>
+        </p:style>
+        <p:txBody>
+          <a:bodyPr rtlCol="0" anchor="ctr"/>
+          <a:lstStyle/>
+          <a:p>
+            <a:pPr algn="ctr"/>
+            <a:endParaRPr lang="en-US"/>
+          </a:p>
+        </p:txBody>
+      </p:sp>
     </p:spTree>
     <p:extLst>
       <p:ext uri="{BB962C8B-B14F-4D97-AF65-F5344CB8AC3E}">
@@ -9205,7 +9438,7 @@
           <a:p>
             <a:r>
               <a:rPr lang="en-US" dirty="0"/>
-              <a:t>Data</a:t>
+              <a:t>Data Analysis Process</a:t>
             </a:r>
           </a:p>
         </p:txBody>
@@ -9280,7 +9513,7 @@
           <p:nvPr>
             <p:extLst>
               <p:ext uri="{D42A27DB-BD31-4B8C-83A1-F6EECF244321}">
-                <p14:modId xmlns:p14="http://schemas.microsoft.com/office/powerpoint/2010/main" val="947789953"/>
+                <p14:modId xmlns:p14="http://schemas.microsoft.com/office/powerpoint/2010/main" val="4134317583"/>
               </p:ext>
             </p:extLst>
           </p:nvPr>
@@ -9383,7 +9616,7 @@
         </p:blipFill>
         <p:spPr>
           <a:xfrm>
-            <a:off x="1354704" y="4224677"/>
+            <a:off x="897504" y="2133600"/>
             <a:ext cx="914400" cy="914400"/>
           </a:xfrm>
         </p:spPr>
@@ -9446,7 +9679,7 @@
         </p:blipFill>
         <p:spPr>
           <a:xfrm>
-            <a:off x="1811904" y="5334000"/>
+            <a:off x="897504" y="3097742"/>
             <a:ext cx="914400" cy="914400"/>
           </a:xfrm>
           <a:prstGeom prst="rect">
@@ -9482,8 +9715,38 @@
         </p:blipFill>
         <p:spPr>
           <a:xfrm>
-            <a:off x="2953657" y="4224677"/>
+            <a:off x="897504" y="4191000"/>
             <a:ext cx="914400" cy="914400"/>
+          </a:xfrm>
+          <a:prstGeom prst="rect">
+            <a:avLst/>
+          </a:prstGeom>
+        </p:spPr>
+      </p:pic>
+      <p:pic>
+        <p:nvPicPr>
+          <p:cNvPr id="12" name="Picture 11">
+            <a:extLst>
+              <a:ext uri="{FF2B5EF4-FFF2-40B4-BE49-F238E27FC236}">
+                <a16:creationId xmlns:a16="http://schemas.microsoft.com/office/drawing/2014/main" id="{1CD6A091-65E1-B37C-EA07-0E2BDE2C4D6E}"/>
+              </a:ext>
+            </a:extLst>
+          </p:cNvPr>
+          <p:cNvPicPr>
+            <a:picLocks noChangeAspect="1"/>
+          </p:cNvPicPr>
+          <p:nvPr/>
+        </p:nvPicPr>
+        <p:blipFill>
+          <a:blip r:embed="rId9"/>
+          <a:stretch>
+            <a:fillRect/>
+          </a:stretch>
+        </p:blipFill>
+        <p:spPr>
+          <a:xfrm>
+            <a:off x="2438400" y="2879725"/>
+            <a:ext cx="6192713" cy="1098550"/>
           </a:xfrm>
           <a:prstGeom prst="rect">
             <a:avLst/>
@@ -9656,132 +9919,6 @@
           <a:p>
             <a:r>
               <a:rPr lang="en-US" dirty="0"/>
-              <a:t>Airbnb App</a:t>
-            </a:r>
-          </a:p>
-        </p:txBody>
-      </p:sp>
-      <p:sp>
-        <p:nvSpPr>
-          <p:cNvPr id="3" name="Content Placeholder 2">
-            <a:extLst>
-              <a:ext uri="{FF2B5EF4-FFF2-40B4-BE49-F238E27FC236}">
-                <a16:creationId xmlns:a16="http://schemas.microsoft.com/office/drawing/2014/main" id="{C7B91AE8-DB84-2709-AD94-D554AAC6377A}"/>
-              </a:ext>
-            </a:extLst>
-          </p:cNvPr>
-          <p:cNvSpPr>
-            <a:spLocks noGrp="1"/>
-          </p:cNvSpPr>
-          <p:nvPr>
-            <p:ph idx="1"/>
-          </p:nvPr>
-        </p:nvSpPr>
-        <p:spPr/>
-        <p:txBody>
-          <a:bodyPr/>
-          <a:lstStyle/>
-          <a:p>
-            <a:r>
-              <a:rPr lang="en-US" dirty="0"/>
-              <a:t>App to explorer Airbnb Listing Data and Predicting Prices:   </a:t>
-            </a:r>
-          </a:p>
-          <a:p>
-            <a:pPr lvl="1"/>
-            <a:r>
-              <a:rPr lang="en-US" dirty="0">
-                <a:hlinkClick r:id="rId2"/>
-              </a:rPr>
-              <a:t>Airbnb Explorer App</a:t>
-            </a:r>
-            <a:endParaRPr lang="en-US" dirty="0"/>
-          </a:p>
-        </p:txBody>
-      </p:sp>
-      <p:pic>
-        <p:nvPicPr>
-          <p:cNvPr id="4" name="Picture 3">
-            <a:extLst>
-              <a:ext uri="{FF2B5EF4-FFF2-40B4-BE49-F238E27FC236}">
-                <a16:creationId xmlns:a16="http://schemas.microsoft.com/office/drawing/2014/main" id="{A8CB7228-7FB3-D8E3-C350-443371C6DE7C}"/>
-              </a:ext>
-            </a:extLst>
-          </p:cNvPr>
-          <p:cNvPicPr>
-            <a:picLocks noChangeAspect="1"/>
-          </p:cNvPicPr>
-          <p:nvPr/>
-        </p:nvPicPr>
-        <p:blipFill>
-          <a:blip r:embed="rId3"/>
-          <a:stretch>
-            <a:fillRect/>
-          </a:stretch>
-        </p:blipFill>
-        <p:spPr>
-          <a:xfrm>
-            <a:off x="8475134" y="534458"/>
-            <a:ext cx="2353732" cy="735542"/>
-          </a:xfrm>
-          <a:prstGeom prst="rect">
-            <a:avLst/>
-          </a:prstGeom>
-        </p:spPr>
-      </p:pic>
-    </p:spTree>
-    <p:extLst>
-      <p:ext uri="{BB962C8B-B14F-4D97-AF65-F5344CB8AC3E}">
-        <p14:creationId xmlns:p14="http://schemas.microsoft.com/office/powerpoint/2010/main" val="171714068"/>
-      </p:ext>
-    </p:extLst>
-  </p:cSld>
-  <p:clrMapOvr>
-    <a:masterClrMapping/>
-  </p:clrMapOvr>
-</p:sld>
-</file>
-
-<file path=ppt/slides/slide7.xml><?xml version="1.0" encoding="utf-8"?>
-<p:sld xmlns:a="http://schemas.openxmlformats.org/drawingml/2006/main" xmlns:r="http://schemas.openxmlformats.org/officeDocument/2006/relationships" xmlns:p="http://schemas.openxmlformats.org/presentationml/2006/main">
-  <p:cSld>
-    <p:spTree>
-      <p:nvGrpSpPr>
-        <p:cNvPr id="1" name=""/>
-        <p:cNvGrpSpPr/>
-        <p:nvPr/>
-      </p:nvGrpSpPr>
-      <p:grpSpPr>
-        <a:xfrm>
-          <a:off x="0" y="0"/>
-          <a:ext cx="0" cy="0"/>
-          <a:chOff x="0" y="0"/>
-          <a:chExt cx="0" cy="0"/>
-        </a:xfrm>
-      </p:grpSpPr>
-      <p:sp>
-        <p:nvSpPr>
-          <p:cNvPr id="2" name="Title 1">
-            <a:extLst>
-              <a:ext uri="{FF2B5EF4-FFF2-40B4-BE49-F238E27FC236}">
-                <a16:creationId xmlns:a16="http://schemas.microsoft.com/office/drawing/2014/main" id="{DC1C6C97-D9F6-95D4-541A-AB97EAF55F22}"/>
-              </a:ext>
-            </a:extLst>
-          </p:cNvPr>
-          <p:cNvSpPr>
-            <a:spLocks noGrp="1"/>
-          </p:cNvSpPr>
-          <p:nvPr>
-            <p:ph type="title"/>
-          </p:nvPr>
-        </p:nvSpPr>
-        <p:spPr/>
-        <p:txBody>
-          <a:bodyPr/>
-          <a:lstStyle/>
-          <a:p>
-            <a:r>
-              <a:rPr lang="en-US" dirty="0"/>
               <a:t>Conclusions and Recommendations</a:t>
             </a:r>
           </a:p>
@@ -9846,6 +9983,228 @@
     <p:extLst>
       <p:ext uri="{BB962C8B-B14F-4D97-AF65-F5344CB8AC3E}">
         <p14:creationId xmlns:p14="http://schemas.microsoft.com/office/powerpoint/2010/main" val="4287857505"/>
+      </p:ext>
+    </p:extLst>
+  </p:cSld>
+  <p:clrMapOvr>
+    <a:masterClrMapping/>
+  </p:clrMapOvr>
+</p:sld>
+</file>
+
+<file path=ppt/slides/slide7.xml><?xml version="1.0" encoding="utf-8"?>
+<p:sld xmlns:a="http://schemas.openxmlformats.org/drawingml/2006/main" xmlns:r="http://schemas.openxmlformats.org/officeDocument/2006/relationships" xmlns:p="http://schemas.openxmlformats.org/presentationml/2006/main">
+  <p:cSld>
+    <p:spTree>
+      <p:nvGrpSpPr>
+        <p:cNvPr id="1" name=""/>
+        <p:cNvGrpSpPr/>
+        <p:nvPr/>
+      </p:nvGrpSpPr>
+      <p:grpSpPr>
+        <a:xfrm>
+          <a:off x="0" y="0"/>
+          <a:ext cx="0" cy="0"/>
+          <a:chOff x="0" y="0"/>
+          <a:chExt cx="0" cy="0"/>
+        </a:xfrm>
+      </p:grpSpPr>
+      <p:sp>
+        <p:nvSpPr>
+          <p:cNvPr id="2" name="Title 1">
+            <a:extLst>
+              <a:ext uri="{FF2B5EF4-FFF2-40B4-BE49-F238E27FC236}">
+                <a16:creationId xmlns:a16="http://schemas.microsoft.com/office/drawing/2014/main" id="{DC1C6C97-D9F6-95D4-541A-AB97EAF55F22}"/>
+              </a:ext>
+            </a:extLst>
+          </p:cNvPr>
+          <p:cNvSpPr>
+            <a:spLocks noGrp="1"/>
+          </p:cNvSpPr>
+          <p:nvPr>
+            <p:ph type="title"/>
+          </p:nvPr>
+        </p:nvSpPr>
+        <p:spPr/>
+        <p:txBody>
+          <a:bodyPr/>
+          <a:lstStyle/>
+          <a:p>
+            <a:r>
+              <a:rPr lang="en-US" dirty="0"/>
+              <a:t>Airbnb App</a:t>
+            </a:r>
+          </a:p>
+        </p:txBody>
+      </p:sp>
+      <p:sp>
+        <p:nvSpPr>
+          <p:cNvPr id="3" name="Content Placeholder 2">
+            <a:extLst>
+              <a:ext uri="{FF2B5EF4-FFF2-40B4-BE49-F238E27FC236}">
+                <a16:creationId xmlns:a16="http://schemas.microsoft.com/office/drawing/2014/main" id="{C7B91AE8-DB84-2709-AD94-D554AAC6377A}"/>
+              </a:ext>
+            </a:extLst>
+          </p:cNvPr>
+          <p:cNvSpPr>
+            <a:spLocks noGrp="1"/>
+          </p:cNvSpPr>
+          <p:nvPr>
+            <p:ph idx="1"/>
+          </p:nvPr>
+        </p:nvSpPr>
+        <p:spPr/>
+        <p:txBody>
+          <a:bodyPr/>
+          <a:lstStyle/>
+          <a:p>
+            <a:r>
+              <a:rPr lang="en-US" dirty="0"/>
+              <a:t>App to explorer Airbnb Listing Data and Predicting Prices:   </a:t>
+            </a:r>
+          </a:p>
+          <a:p>
+            <a:pPr lvl="1"/>
+            <a:r>
+              <a:rPr lang="en-US" dirty="0">
+                <a:hlinkClick r:id="rId2"/>
+              </a:rPr>
+              <a:t>Airbnb Explorer App</a:t>
+            </a:r>
+            <a:endParaRPr lang="en-US" dirty="0"/>
+          </a:p>
+        </p:txBody>
+      </p:sp>
+      <p:pic>
+        <p:nvPicPr>
+          <p:cNvPr id="6" name="Picture 5">
+            <a:extLst>
+              <a:ext uri="{FF2B5EF4-FFF2-40B4-BE49-F238E27FC236}">
+                <a16:creationId xmlns:a16="http://schemas.microsoft.com/office/drawing/2014/main" id="{5AD3705D-1B64-E6B3-8BAD-D6607EAF1197}"/>
+              </a:ext>
+            </a:extLst>
+          </p:cNvPr>
+          <p:cNvPicPr>
+            <a:picLocks noChangeAspect="1"/>
+          </p:cNvPicPr>
+          <p:nvPr/>
+        </p:nvPicPr>
+        <p:blipFill>
+          <a:blip r:embed="rId3"/>
+          <a:stretch>
+            <a:fillRect/>
+          </a:stretch>
+        </p:blipFill>
+        <p:spPr>
+          <a:xfrm>
+            <a:off x="1553925" y="3113371"/>
+            <a:ext cx="6843486" cy="3246589"/>
+          </a:xfrm>
+          <a:prstGeom prst="rect">
+            <a:avLst/>
+          </a:prstGeom>
+        </p:spPr>
+      </p:pic>
+    </p:spTree>
+    <p:extLst>
+      <p:ext uri="{BB962C8B-B14F-4D97-AF65-F5344CB8AC3E}">
+        <p14:creationId xmlns:p14="http://schemas.microsoft.com/office/powerpoint/2010/main" val="171714068"/>
+      </p:ext>
+    </p:extLst>
+  </p:cSld>
+  <p:clrMapOvr>
+    <a:masterClrMapping/>
+  </p:clrMapOvr>
+</p:sld>
+</file>
+
+<file path=ppt/slides/slide8.xml><?xml version="1.0" encoding="utf-8"?>
+<p:sld xmlns:a="http://schemas.openxmlformats.org/drawingml/2006/main" xmlns:r="http://schemas.openxmlformats.org/officeDocument/2006/relationships" xmlns:p="http://schemas.openxmlformats.org/presentationml/2006/main">
+  <p:cSld>
+    <p:spTree>
+      <p:nvGrpSpPr>
+        <p:cNvPr id="1" name=""/>
+        <p:cNvGrpSpPr/>
+        <p:nvPr/>
+      </p:nvGrpSpPr>
+      <p:grpSpPr>
+        <a:xfrm>
+          <a:off x="0" y="0"/>
+          <a:ext cx="0" cy="0"/>
+          <a:chOff x="0" y="0"/>
+          <a:chExt cx="0" cy="0"/>
+        </a:xfrm>
+      </p:grpSpPr>
+      <p:sp>
+        <p:nvSpPr>
+          <p:cNvPr id="2" name="Title 1">
+            <a:extLst>
+              <a:ext uri="{FF2B5EF4-FFF2-40B4-BE49-F238E27FC236}">
+                <a16:creationId xmlns:a16="http://schemas.microsoft.com/office/drawing/2014/main" id="{DC1C6C97-D9F6-95D4-541A-AB97EAF55F22}"/>
+              </a:ext>
+            </a:extLst>
+          </p:cNvPr>
+          <p:cNvSpPr>
+            <a:spLocks noGrp="1"/>
+          </p:cNvSpPr>
+          <p:nvPr>
+            <p:ph type="title"/>
+          </p:nvPr>
+        </p:nvSpPr>
+        <p:spPr>
+          <a:xfrm>
+            <a:off x="2514600" y="3124200"/>
+            <a:ext cx="5181600" cy="2057400"/>
+          </a:xfrm>
+        </p:spPr>
+        <p:txBody>
+          <a:bodyPr>
+            <a:noAutofit/>
+          </a:bodyPr>
+          <a:lstStyle/>
+          <a:p>
+            <a:r>
+              <a:rPr lang="en-US" sz="5400"/>
+              <a:t>Thank You!</a:t>
+            </a:r>
+            <a:endParaRPr lang="en-US" sz="5400" dirty="0"/>
+          </a:p>
+        </p:txBody>
+      </p:sp>
+      <p:pic>
+        <p:nvPicPr>
+          <p:cNvPr id="4" name="Picture 3">
+            <a:extLst>
+              <a:ext uri="{FF2B5EF4-FFF2-40B4-BE49-F238E27FC236}">
+                <a16:creationId xmlns:a16="http://schemas.microsoft.com/office/drawing/2014/main" id="{A8CB7228-7FB3-D8E3-C350-443371C6DE7C}"/>
+              </a:ext>
+            </a:extLst>
+          </p:cNvPr>
+          <p:cNvPicPr>
+            <a:picLocks noChangeAspect="1"/>
+          </p:cNvPicPr>
+          <p:nvPr/>
+        </p:nvPicPr>
+        <p:blipFill>
+          <a:blip r:embed="rId2"/>
+          <a:stretch>
+            <a:fillRect/>
+          </a:stretch>
+        </p:blipFill>
+        <p:spPr>
+          <a:xfrm>
+            <a:off x="8475134" y="534458"/>
+            <a:ext cx="2353732" cy="735542"/>
+          </a:xfrm>
+          <a:prstGeom prst="rect">
+            <a:avLst/>
+          </a:prstGeom>
+        </p:spPr>
+      </p:pic>
+    </p:spTree>
+    <p:extLst>
+      <p:ext uri="{BB962C8B-B14F-4D97-AF65-F5344CB8AC3E}">
+        <p14:creationId xmlns:p14="http://schemas.microsoft.com/office/powerpoint/2010/main" val="269692042"/>
       </p:ext>
     </p:extLst>
   </p:cSld>

</xml_diff>